<commit_message>
update powerpoint slides, add comment
</commit_message>
<xml_diff>
--- a/COMP4441_final_project.pptx
+++ b/COMP4441_final_project.pptx
@@ -5,7 +5,7 @@
     <p:sldMasterId id="2147483648" r:id="rId1"/>
   </p:sldMasterIdLst>
   <p:notesMasterIdLst>
-    <p:notesMasterId r:id="rId17"/>
+    <p:notesMasterId r:id="rId12"/>
   </p:notesMasterIdLst>
   <p:sldIdLst>
     <p:sldId id="256" r:id="rId2"/>
@@ -14,15 +14,10 @@
     <p:sldId id="274" r:id="rId5"/>
     <p:sldId id="263" r:id="rId6"/>
     <p:sldId id="264" r:id="rId7"/>
-    <p:sldId id="265" r:id="rId8"/>
-    <p:sldId id="266" r:id="rId9"/>
+    <p:sldId id="266" r:id="rId8"/>
+    <p:sldId id="265" r:id="rId9"/>
     <p:sldId id="267" r:id="rId10"/>
     <p:sldId id="268" r:id="rId11"/>
-    <p:sldId id="269" r:id="rId12"/>
-    <p:sldId id="270" r:id="rId13"/>
-    <p:sldId id="271" r:id="rId14"/>
-    <p:sldId id="272" r:id="rId15"/>
-    <p:sldId id="273" r:id="rId16"/>
   </p:sldIdLst>
   <p:sldSz cx="12192000" cy="6858000"/>
   <p:notesSz cx="6858000" cy="9144000"/>
@@ -211,7 +206,7 @@
           <a:p>
             <a:fld id="{0899C1D7-0031-1541-AA63-7FAEC1216BBD}" type="datetimeFigureOut">
               <a:rPr lang="en-US" smtClean="0"/>
-              <a:t>5/15/2022</a:t>
+              <a:t>5/18/2022</a:t>
             </a:fld>
             <a:endParaRPr lang="en-US"/>
           </a:p>
@@ -478,6 +473,285 @@
 </p:notesMaster>
 </file>
 
+<file path=ppt/notesSlides/notesSlide1.xml><?xml version="1.0" encoding="utf-8"?>
+<p:notes xmlns:a="http://schemas.openxmlformats.org/drawingml/2006/main" xmlns:r="http://schemas.openxmlformats.org/officeDocument/2006/relationships" xmlns:p="http://schemas.openxmlformats.org/presentationml/2006/main">
+  <p:cSld>
+    <p:spTree>
+      <p:nvGrpSpPr>
+        <p:cNvPr id="1" name=""/>
+        <p:cNvGrpSpPr/>
+        <p:nvPr/>
+      </p:nvGrpSpPr>
+      <p:grpSpPr>
+        <a:xfrm>
+          <a:off x="0" y="0"/>
+          <a:ext cx="0" cy="0"/>
+          <a:chOff x="0" y="0"/>
+          <a:chExt cx="0" cy="0"/>
+        </a:xfrm>
+      </p:grpSpPr>
+      <p:sp>
+        <p:nvSpPr>
+          <p:cNvPr id="2" name="Slide Image Placeholder 1"/>
+          <p:cNvSpPr>
+            <a:spLocks noGrp="1" noRot="1" noChangeAspect="1"/>
+          </p:cNvSpPr>
+          <p:nvPr>
+            <p:ph type="sldImg"/>
+          </p:nvPr>
+        </p:nvSpPr>
+        <p:spPr/>
+      </p:sp>
+      <p:sp>
+        <p:nvSpPr>
+          <p:cNvPr id="3" name="Notes Placeholder 2"/>
+          <p:cNvSpPr>
+            <a:spLocks noGrp="1"/>
+          </p:cNvSpPr>
+          <p:nvPr>
+            <p:ph type="body" idx="1"/>
+          </p:nvPr>
+        </p:nvSpPr>
+        <p:spPr/>
+        <p:txBody>
+          <a:bodyPr/>
+          <a:lstStyle/>
+          <a:p>
+            <a:r>
+              <a:rPr lang="en-US" dirty="0"/>
+              <a:t>The dataset from FARS is incredibly detailed, 32 different CSVs to pull data from, and it gave details like the weather, the VIN number, make, model, etc. </a:t>
+            </a:r>
+          </a:p>
+        </p:txBody>
+      </p:sp>
+      <p:sp>
+        <p:nvSpPr>
+          <p:cNvPr id="4" name="Slide Number Placeholder 3"/>
+          <p:cNvSpPr>
+            <a:spLocks noGrp="1"/>
+          </p:cNvSpPr>
+          <p:nvPr>
+            <p:ph type="sldNum" sz="quarter" idx="5"/>
+          </p:nvPr>
+        </p:nvSpPr>
+        <p:spPr/>
+        <p:txBody>
+          <a:bodyPr/>
+          <a:lstStyle/>
+          <a:p>
+            <a:fld id="{5CD270A4-E417-1544-8D83-51C2B4F7CE0F}" type="slidenum">
+              <a:rPr lang="en-US" smtClean="0"/>
+              <a:t>3</a:t>
+            </a:fld>
+            <a:endParaRPr lang="en-US"/>
+          </a:p>
+        </p:txBody>
+      </p:sp>
+    </p:spTree>
+    <p:extLst>
+      <p:ext uri="{BB962C8B-B14F-4D97-AF65-F5344CB8AC3E}">
+        <p14:creationId xmlns:p14="http://schemas.microsoft.com/office/powerpoint/2010/main" val="3646844322"/>
+      </p:ext>
+    </p:extLst>
+  </p:cSld>
+  <p:clrMapOvr>
+    <a:masterClrMapping/>
+  </p:clrMapOvr>
+</p:notes>
+</file>
+
+<file path=ppt/notesSlides/notesSlide2.xml><?xml version="1.0" encoding="utf-8"?>
+<p:notes xmlns:a="http://schemas.openxmlformats.org/drawingml/2006/main" xmlns:r="http://schemas.openxmlformats.org/officeDocument/2006/relationships" xmlns:p="http://schemas.openxmlformats.org/presentationml/2006/main">
+  <p:cSld>
+    <p:spTree>
+      <p:nvGrpSpPr>
+        <p:cNvPr id="1" name=""/>
+        <p:cNvGrpSpPr/>
+        <p:nvPr/>
+      </p:nvGrpSpPr>
+      <p:grpSpPr>
+        <a:xfrm>
+          <a:off x="0" y="0"/>
+          <a:ext cx="0" cy="0"/>
+          <a:chOff x="0" y="0"/>
+          <a:chExt cx="0" cy="0"/>
+        </a:xfrm>
+      </p:grpSpPr>
+      <p:sp>
+        <p:nvSpPr>
+          <p:cNvPr id="2" name="Slide Image Placeholder 1"/>
+          <p:cNvSpPr>
+            <a:spLocks noGrp="1" noRot="1" noChangeAspect="1"/>
+          </p:cNvSpPr>
+          <p:nvPr>
+            <p:ph type="sldImg"/>
+          </p:nvPr>
+        </p:nvSpPr>
+        <p:spPr/>
+      </p:sp>
+      <p:sp>
+        <p:nvSpPr>
+          <p:cNvPr id="3" name="Notes Placeholder 2"/>
+          <p:cNvSpPr>
+            <a:spLocks noGrp="1"/>
+          </p:cNvSpPr>
+          <p:nvPr>
+            <p:ph type="body" idx="1"/>
+          </p:nvPr>
+        </p:nvSpPr>
+        <p:spPr/>
+        <p:txBody>
+          <a:bodyPr/>
+          <a:lstStyle/>
+          <a:p>
+            <a:r>
+              <a:rPr lang="en-US" dirty="0"/>
+              <a:t>The data for FARS is both acronymed and codified so that a 7 means died at scene and you need to be able to translate the coded number into a better context </a:t>
+            </a:r>
+          </a:p>
+        </p:txBody>
+      </p:sp>
+      <p:sp>
+        <p:nvSpPr>
+          <p:cNvPr id="4" name="Slide Number Placeholder 3"/>
+          <p:cNvSpPr>
+            <a:spLocks noGrp="1"/>
+          </p:cNvSpPr>
+          <p:nvPr>
+            <p:ph type="sldNum" sz="quarter" idx="5"/>
+          </p:nvPr>
+        </p:nvSpPr>
+        <p:spPr/>
+        <p:txBody>
+          <a:bodyPr/>
+          <a:lstStyle/>
+          <a:p>
+            <a:fld id="{5CD270A4-E417-1544-8D83-51C2B4F7CE0F}" type="slidenum">
+              <a:rPr lang="en-US" smtClean="0"/>
+              <a:t>4</a:t>
+            </a:fld>
+            <a:endParaRPr lang="en-US"/>
+          </a:p>
+        </p:txBody>
+      </p:sp>
+    </p:spTree>
+    <p:extLst>
+      <p:ext uri="{BB962C8B-B14F-4D97-AF65-F5344CB8AC3E}">
+        <p14:creationId xmlns:p14="http://schemas.microsoft.com/office/powerpoint/2010/main" val="743034532"/>
+      </p:ext>
+    </p:extLst>
+  </p:cSld>
+  <p:clrMapOvr>
+    <a:masterClrMapping/>
+  </p:clrMapOvr>
+</p:notes>
+</file>
+
+<file path=ppt/notesSlides/notesSlide3.xml><?xml version="1.0" encoding="utf-8"?>
+<p:notes xmlns:a="http://schemas.openxmlformats.org/drawingml/2006/main" xmlns:r="http://schemas.openxmlformats.org/officeDocument/2006/relationships" xmlns:p="http://schemas.openxmlformats.org/presentationml/2006/main">
+  <p:cSld>
+    <p:spTree>
+      <p:nvGrpSpPr>
+        <p:cNvPr id="1" name=""/>
+        <p:cNvGrpSpPr/>
+        <p:nvPr/>
+      </p:nvGrpSpPr>
+      <p:grpSpPr>
+        <a:xfrm>
+          <a:off x="0" y="0"/>
+          <a:ext cx="0" cy="0"/>
+          <a:chOff x="0" y="0"/>
+          <a:chExt cx="0" cy="0"/>
+        </a:xfrm>
+      </p:grpSpPr>
+      <p:sp>
+        <p:nvSpPr>
+          <p:cNvPr id="2" name="Slide Image Placeholder 1"/>
+          <p:cNvSpPr>
+            <a:spLocks noGrp="1" noRot="1" noChangeAspect="1"/>
+          </p:cNvSpPr>
+          <p:nvPr>
+            <p:ph type="sldImg"/>
+          </p:nvPr>
+        </p:nvSpPr>
+        <p:spPr/>
+      </p:sp>
+      <p:sp>
+        <p:nvSpPr>
+          <p:cNvPr id="3" name="Notes Placeholder 2"/>
+          <p:cNvSpPr>
+            <a:spLocks noGrp="1"/>
+          </p:cNvSpPr>
+          <p:nvPr>
+            <p:ph type="body" idx="1"/>
+          </p:nvPr>
+        </p:nvSpPr>
+        <p:spPr/>
+        <p:txBody>
+          <a:bodyPr/>
+          <a:lstStyle/>
+          <a:p>
+            <a:r>
+              <a:rPr lang="en-US" dirty="0"/>
+              <a:t>Explain results from R code </a:t>
+            </a:r>
+          </a:p>
+          <a:p>
+            <a:r>
+              <a:rPr lang="en-US" dirty="0"/>
+              <a:t>We can see the fatality rate went up from 2019-2020. </a:t>
+            </a:r>
+          </a:p>
+          <a:p>
+            <a:r>
+              <a:rPr lang="en-US" dirty="0"/>
+              <a:t>The results don’t show the pedestrian deaths cause by car wreck facilities, </a:t>
+            </a:r>
+          </a:p>
+          <a:p>
+            <a:r>
+              <a:rPr lang="en-US" dirty="0"/>
+              <a:t>So why did this happen? </a:t>
+            </a:r>
+          </a:p>
+        </p:txBody>
+      </p:sp>
+      <p:sp>
+        <p:nvSpPr>
+          <p:cNvPr id="4" name="Slide Number Placeholder 3"/>
+          <p:cNvSpPr>
+            <a:spLocks noGrp="1"/>
+          </p:cNvSpPr>
+          <p:nvPr>
+            <p:ph type="sldNum" sz="quarter" idx="5"/>
+          </p:nvPr>
+        </p:nvSpPr>
+        <p:spPr/>
+        <p:txBody>
+          <a:bodyPr/>
+          <a:lstStyle/>
+          <a:p>
+            <a:fld id="{5CD270A4-E417-1544-8D83-51C2B4F7CE0F}" type="slidenum">
+              <a:rPr lang="en-US" smtClean="0"/>
+              <a:t>5</a:t>
+            </a:fld>
+            <a:endParaRPr lang="en-US"/>
+          </a:p>
+        </p:txBody>
+      </p:sp>
+    </p:spTree>
+    <p:extLst>
+      <p:ext uri="{BB962C8B-B14F-4D97-AF65-F5344CB8AC3E}">
+        <p14:creationId xmlns:p14="http://schemas.microsoft.com/office/powerpoint/2010/main" val="2310014589"/>
+      </p:ext>
+    </p:extLst>
+  </p:cSld>
+  <p:clrMapOvr>
+    <a:masterClrMapping/>
+  </p:clrMapOvr>
+</p:notes>
+</file>
+
 <file path=ppt/slideLayouts/slideLayout1.xml><?xml version="1.0" encoding="utf-8"?>
 <p:sldLayout xmlns:a="http://schemas.openxmlformats.org/drawingml/2006/main" xmlns:r="http://schemas.openxmlformats.org/officeDocument/2006/relationships" xmlns:p="http://schemas.openxmlformats.org/presentationml/2006/main" preserve="1" userDrawn="1">
   <p:cSld name="Two Content">
@@ -7081,7 +7355,7 @@
           <a:p>
             <a:fld id="{D386965C-165C-764D-B490-A5796C92088F}" type="datetimeFigureOut">
               <a:rPr lang="en-US" smtClean="0"/>
-              <a:t>5/15/2022</a:t>
+              <a:t>5/18/2022</a:t>
             </a:fld>
             <a:endParaRPr lang="en-US"/>
           </a:p>
@@ -7583,7 +7857,7 @@
           <a:p>
             <a:r>
               <a:rPr lang="en-US" dirty="0"/>
-              <a:t>2022/05/05</a:t>
+              <a:t>2022/05/18</a:t>
             </a:r>
           </a:p>
         </p:txBody>
@@ -7639,32 +7913,10 @@
           <a:bodyPr/>
           <a:lstStyle/>
           <a:p>
-            <a:endParaRPr lang="en-US"/>
-          </a:p>
-        </p:txBody>
-      </p:sp>
-      <p:sp>
-        <p:nvSpPr>
-          <p:cNvPr id="3" name="Text Placeholder 2">
-            <a:extLst>
-              <a:ext uri="{FF2B5EF4-FFF2-40B4-BE49-F238E27FC236}">
-                <a16:creationId xmlns:a16="http://schemas.microsoft.com/office/drawing/2014/main" id="{D4CFA5C2-AC63-1D4D-BDFB-532AE38ABF1D}"/>
-              </a:ext>
-            </a:extLst>
-          </p:cNvPr>
-          <p:cNvSpPr>
-            <a:spLocks noGrp="1"/>
-          </p:cNvSpPr>
-          <p:nvPr>
-            <p:ph type="body" idx="1"/>
-          </p:nvPr>
-        </p:nvSpPr>
-        <p:spPr/>
-        <p:txBody>
-          <a:bodyPr/>
-          <a:lstStyle/>
-          <a:p>
-            <a:endParaRPr lang="en-US"/>
+            <a:r>
+              <a:rPr lang="en-US" dirty="0"/>
+              <a:t>Comments &amp; Questions ?</a:t>
+            </a:r>
           </a:p>
         </p:txBody>
       </p:sp>
@@ -7684,12 +7936,29 @@
             <p:ph type="body" idx="10"/>
           </p:nvPr>
         </p:nvSpPr>
-        <p:spPr/>
+        <p:spPr>
+          <a:xfrm>
+            <a:off x="2470150" y="2070938"/>
+            <a:ext cx="6452329" cy="4079696"/>
+          </a:xfrm>
+        </p:spPr>
         <p:txBody>
           <a:bodyPr/>
           <a:lstStyle/>
           <a:p>
-            <a:endParaRPr lang="en-US"/>
+            <a:r>
+              <a:rPr lang="en-US" dirty="0"/>
+              <a:t>Thank You! </a:t>
+            </a:r>
+          </a:p>
+          <a:p>
+            <a:endParaRPr lang="en-US" dirty="0"/>
+          </a:p>
+          <a:p>
+            <a:r>
+              <a:rPr lang="en-US" dirty="0"/>
+              <a:t>Katie Chen &amp; Heather Lemon </a:t>
+            </a:r>
           </a:p>
         </p:txBody>
       </p:sp>
@@ -7697,506 +7966,6 @@
     <p:extLst>
       <p:ext uri="{BB962C8B-B14F-4D97-AF65-F5344CB8AC3E}">
         <p14:creationId xmlns:p14="http://schemas.microsoft.com/office/powerpoint/2010/main" val="3559523306"/>
-      </p:ext>
-    </p:extLst>
-  </p:cSld>
-  <p:clrMapOvr>
-    <a:masterClrMapping/>
-  </p:clrMapOvr>
-</p:sld>
-</file>
-
-<file path=ppt/slides/slide11.xml><?xml version="1.0" encoding="utf-8"?>
-<p:sld xmlns:a="http://schemas.openxmlformats.org/drawingml/2006/main" xmlns:r="http://schemas.openxmlformats.org/officeDocument/2006/relationships" xmlns:p="http://schemas.openxmlformats.org/presentationml/2006/main">
-  <p:cSld>
-    <p:spTree>
-      <p:nvGrpSpPr>
-        <p:cNvPr id="1" name=""/>
-        <p:cNvGrpSpPr/>
-        <p:nvPr/>
-      </p:nvGrpSpPr>
-      <p:grpSpPr>
-        <a:xfrm>
-          <a:off x="0" y="0"/>
-          <a:ext cx="0" cy="0"/>
-          <a:chOff x="0" y="0"/>
-          <a:chExt cx="0" cy="0"/>
-        </a:xfrm>
-      </p:grpSpPr>
-      <p:sp>
-        <p:nvSpPr>
-          <p:cNvPr id="2" name="Title 1">
-            <a:extLst>
-              <a:ext uri="{FF2B5EF4-FFF2-40B4-BE49-F238E27FC236}">
-                <a16:creationId xmlns:a16="http://schemas.microsoft.com/office/drawing/2014/main" id="{73651502-26B8-2141-A3C9-CD6BEAF631CE}"/>
-              </a:ext>
-            </a:extLst>
-          </p:cNvPr>
-          <p:cNvSpPr>
-            <a:spLocks noGrp="1"/>
-          </p:cNvSpPr>
-          <p:nvPr>
-            <p:ph type="title"/>
-          </p:nvPr>
-        </p:nvSpPr>
-        <p:spPr/>
-        <p:txBody>
-          <a:bodyPr/>
-          <a:lstStyle/>
-          <a:p>
-            <a:endParaRPr lang="en-US"/>
-          </a:p>
-        </p:txBody>
-      </p:sp>
-      <p:sp>
-        <p:nvSpPr>
-          <p:cNvPr id="3" name="Text Placeholder 2">
-            <a:extLst>
-              <a:ext uri="{FF2B5EF4-FFF2-40B4-BE49-F238E27FC236}">
-                <a16:creationId xmlns:a16="http://schemas.microsoft.com/office/drawing/2014/main" id="{6FD3F824-67F2-6C4A-87DA-D380333B3B67}"/>
-              </a:ext>
-            </a:extLst>
-          </p:cNvPr>
-          <p:cNvSpPr>
-            <a:spLocks noGrp="1"/>
-          </p:cNvSpPr>
-          <p:nvPr>
-            <p:ph type="body" idx="1"/>
-          </p:nvPr>
-        </p:nvSpPr>
-        <p:spPr/>
-        <p:txBody>
-          <a:bodyPr/>
-          <a:lstStyle/>
-          <a:p>
-            <a:endParaRPr lang="en-US"/>
-          </a:p>
-        </p:txBody>
-      </p:sp>
-      <p:sp>
-        <p:nvSpPr>
-          <p:cNvPr id="4" name="Text Placeholder 3">
-            <a:extLst>
-              <a:ext uri="{FF2B5EF4-FFF2-40B4-BE49-F238E27FC236}">
-                <a16:creationId xmlns:a16="http://schemas.microsoft.com/office/drawing/2014/main" id="{3BEB3040-D840-FC42-B798-7B8DCCFEDCA2}"/>
-              </a:ext>
-            </a:extLst>
-          </p:cNvPr>
-          <p:cNvSpPr>
-            <a:spLocks noGrp="1"/>
-          </p:cNvSpPr>
-          <p:nvPr>
-            <p:ph type="body" idx="10"/>
-          </p:nvPr>
-        </p:nvSpPr>
-        <p:spPr/>
-        <p:txBody>
-          <a:bodyPr/>
-          <a:lstStyle/>
-          <a:p>
-            <a:endParaRPr lang="en-US"/>
-          </a:p>
-        </p:txBody>
-      </p:sp>
-    </p:spTree>
-    <p:extLst>
-      <p:ext uri="{BB962C8B-B14F-4D97-AF65-F5344CB8AC3E}">
-        <p14:creationId xmlns:p14="http://schemas.microsoft.com/office/powerpoint/2010/main" val="24590043"/>
-      </p:ext>
-    </p:extLst>
-  </p:cSld>
-  <p:clrMapOvr>
-    <a:masterClrMapping/>
-  </p:clrMapOvr>
-</p:sld>
-</file>
-
-<file path=ppt/slides/slide12.xml><?xml version="1.0" encoding="utf-8"?>
-<p:sld xmlns:a="http://schemas.openxmlformats.org/drawingml/2006/main" xmlns:r="http://schemas.openxmlformats.org/officeDocument/2006/relationships" xmlns:p="http://schemas.openxmlformats.org/presentationml/2006/main">
-  <p:cSld>
-    <p:spTree>
-      <p:nvGrpSpPr>
-        <p:cNvPr id="1" name=""/>
-        <p:cNvGrpSpPr/>
-        <p:nvPr/>
-      </p:nvGrpSpPr>
-      <p:grpSpPr>
-        <a:xfrm>
-          <a:off x="0" y="0"/>
-          <a:ext cx="0" cy="0"/>
-          <a:chOff x="0" y="0"/>
-          <a:chExt cx="0" cy="0"/>
-        </a:xfrm>
-      </p:grpSpPr>
-      <p:sp>
-        <p:nvSpPr>
-          <p:cNvPr id="2" name="Title 1">
-            <a:extLst>
-              <a:ext uri="{FF2B5EF4-FFF2-40B4-BE49-F238E27FC236}">
-                <a16:creationId xmlns:a16="http://schemas.microsoft.com/office/drawing/2014/main" id="{3F74C0BE-0683-B140-97D0-062BB48C2E6B}"/>
-              </a:ext>
-            </a:extLst>
-          </p:cNvPr>
-          <p:cNvSpPr>
-            <a:spLocks noGrp="1"/>
-          </p:cNvSpPr>
-          <p:nvPr>
-            <p:ph type="title"/>
-          </p:nvPr>
-        </p:nvSpPr>
-        <p:spPr/>
-        <p:txBody>
-          <a:bodyPr/>
-          <a:lstStyle/>
-          <a:p>
-            <a:endParaRPr lang="en-US"/>
-          </a:p>
-        </p:txBody>
-      </p:sp>
-      <p:sp>
-        <p:nvSpPr>
-          <p:cNvPr id="3" name="Text Placeholder 2">
-            <a:extLst>
-              <a:ext uri="{FF2B5EF4-FFF2-40B4-BE49-F238E27FC236}">
-                <a16:creationId xmlns:a16="http://schemas.microsoft.com/office/drawing/2014/main" id="{5C1ACD2B-9887-0A4F-A947-A39F3A46A771}"/>
-              </a:ext>
-            </a:extLst>
-          </p:cNvPr>
-          <p:cNvSpPr>
-            <a:spLocks noGrp="1"/>
-          </p:cNvSpPr>
-          <p:nvPr>
-            <p:ph type="body" idx="1"/>
-          </p:nvPr>
-        </p:nvSpPr>
-        <p:spPr/>
-        <p:txBody>
-          <a:bodyPr/>
-          <a:lstStyle/>
-          <a:p>
-            <a:endParaRPr lang="en-US"/>
-          </a:p>
-        </p:txBody>
-      </p:sp>
-    </p:spTree>
-    <p:extLst>
-      <p:ext uri="{BB962C8B-B14F-4D97-AF65-F5344CB8AC3E}">
-        <p14:creationId xmlns:p14="http://schemas.microsoft.com/office/powerpoint/2010/main" val="2409348699"/>
-      </p:ext>
-    </p:extLst>
-  </p:cSld>
-  <p:clrMapOvr>
-    <a:masterClrMapping/>
-  </p:clrMapOvr>
-</p:sld>
-</file>
-
-<file path=ppt/slides/slide13.xml><?xml version="1.0" encoding="utf-8"?>
-<p:sld xmlns:a="http://schemas.openxmlformats.org/drawingml/2006/main" xmlns:r="http://schemas.openxmlformats.org/officeDocument/2006/relationships" xmlns:p="http://schemas.openxmlformats.org/presentationml/2006/main">
-  <p:cSld>
-    <p:spTree>
-      <p:nvGrpSpPr>
-        <p:cNvPr id="1" name=""/>
-        <p:cNvGrpSpPr/>
-        <p:nvPr/>
-      </p:nvGrpSpPr>
-      <p:grpSpPr>
-        <a:xfrm>
-          <a:off x="0" y="0"/>
-          <a:ext cx="0" cy="0"/>
-          <a:chOff x="0" y="0"/>
-          <a:chExt cx="0" cy="0"/>
-        </a:xfrm>
-      </p:grpSpPr>
-      <p:sp>
-        <p:nvSpPr>
-          <p:cNvPr id="2" name="Title 1">
-            <a:extLst>
-              <a:ext uri="{FF2B5EF4-FFF2-40B4-BE49-F238E27FC236}">
-                <a16:creationId xmlns:a16="http://schemas.microsoft.com/office/drawing/2014/main" id="{B8684E65-9272-6945-9928-8DDC1F33474D}"/>
-              </a:ext>
-            </a:extLst>
-          </p:cNvPr>
-          <p:cNvSpPr>
-            <a:spLocks noGrp="1"/>
-          </p:cNvSpPr>
-          <p:nvPr>
-            <p:ph type="title"/>
-          </p:nvPr>
-        </p:nvSpPr>
-        <p:spPr/>
-        <p:txBody>
-          <a:bodyPr/>
-          <a:lstStyle/>
-          <a:p>
-            <a:endParaRPr lang="en-US"/>
-          </a:p>
-        </p:txBody>
-      </p:sp>
-      <p:sp>
-        <p:nvSpPr>
-          <p:cNvPr id="3" name="Text Placeholder 2">
-            <a:extLst>
-              <a:ext uri="{FF2B5EF4-FFF2-40B4-BE49-F238E27FC236}">
-                <a16:creationId xmlns:a16="http://schemas.microsoft.com/office/drawing/2014/main" id="{916DA5DB-DC22-ED42-B003-05BA467F9C00}"/>
-              </a:ext>
-            </a:extLst>
-          </p:cNvPr>
-          <p:cNvSpPr>
-            <a:spLocks noGrp="1"/>
-          </p:cNvSpPr>
-          <p:nvPr>
-            <p:ph type="body" idx="1"/>
-          </p:nvPr>
-        </p:nvSpPr>
-        <p:spPr/>
-        <p:txBody>
-          <a:bodyPr/>
-          <a:lstStyle/>
-          <a:p>
-            <a:endParaRPr lang="en-US"/>
-          </a:p>
-        </p:txBody>
-      </p:sp>
-      <p:sp>
-        <p:nvSpPr>
-          <p:cNvPr id="4" name="Text Placeholder 3">
-            <a:extLst>
-              <a:ext uri="{FF2B5EF4-FFF2-40B4-BE49-F238E27FC236}">
-                <a16:creationId xmlns:a16="http://schemas.microsoft.com/office/drawing/2014/main" id="{78B08BDF-434B-D04A-A5FB-01B444B70BD4}"/>
-              </a:ext>
-            </a:extLst>
-          </p:cNvPr>
-          <p:cNvSpPr>
-            <a:spLocks noGrp="1"/>
-          </p:cNvSpPr>
-          <p:nvPr>
-            <p:ph type="body" idx="10"/>
-          </p:nvPr>
-        </p:nvSpPr>
-        <p:spPr/>
-        <p:txBody>
-          <a:bodyPr/>
-          <a:lstStyle/>
-          <a:p>
-            <a:endParaRPr lang="en-US"/>
-          </a:p>
-        </p:txBody>
-      </p:sp>
-    </p:spTree>
-    <p:extLst>
-      <p:ext uri="{BB962C8B-B14F-4D97-AF65-F5344CB8AC3E}">
-        <p14:creationId xmlns:p14="http://schemas.microsoft.com/office/powerpoint/2010/main" val="4160229133"/>
-      </p:ext>
-    </p:extLst>
-  </p:cSld>
-  <p:clrMapOvr>
-    <a:masterClrMapping/>
-  </p:clrMapOvr>
-</p:sld>
-</file>
-
-<file path=ppt/slides/slide14.xml><?xml version="1.0" encoding="utf-8"?>
-<p:sld xmlns:a="http://schemas.openxmlformats.org/drawingml/2006/main" xmlns:r="http://schemas.openxmlformats.org/officeDocument/2006/relationships" xmlns:p="http://schemas.openxmlformats.org/presentationml/2006/main">
-  <p:cSld>
-    <p:spTree>
-      <p:nvGrpSpPr>
-        <p:cNvPr id="1" name=""/>
-        <p:cNvGrpSpPr/>
-        <p:nvPr/>
-      </p:nvGrpSpPr>
-      <p:grpSpPr>
-        <a:xfrm>
-          <a:off x="0" y="0"/>
-          <a:ext cx="0" cy="0"/>
-          <a:chOff x="0" y="0"/>
-          <a:chExt cx="0" cy="0"/>
-        </a:xfrm>
-      </p:grpSpPr>
-      <p:sp>
-        <p:nvSpPr>
-          <p:cNvPr id="2" name="Title 1">
-            <a:extLst>
-              <a:ext uri="{FF2B5EF4-FFF2-40B4-BE49-F238E27FC236}">
-                <a16:creationId xmlns:a16="http://schemas.microsoft.com/office/drawing/2014/main" id="{926C0DC9-DF5E-684F-9782-683715C8F711}"/>
-              </a:ext>
-            </a:extLst>
-          </p:cNvPr>
-          <p:cNvSpPr>
-            <a:spLocks noGrp="1"/>
-          </p:cNvSpPr>
-          <p:nvPr>
-            <p:ph type="title"/>
-          </p:nvPr>
-        </p:nvSpPr>
-        <p:spPr/>
-        <p:txBody>
-          <a:bodyPr/>
-          <a:lstStyle/>
-          <a:p>
-            <a:endParaRPr lang="en-US"/>
-          </a:p>
-        </p:txBody>
-      </p:sp>
-      <p:sp>
-        <p:nvSpPr>
-          <p:cNvPr id="3" name="Text Placeholder 2">
-            <a:extLst>
-              <a:ext uri="{FF2B5EF4-FFF2-40B4-BE49-F238E27FC236}">
-                <a16:creationId xmlns:a16="http://schemas.microsoft.com/office/drawing/2014/main" id="{709876B9-451E-DD4E-A877-EE2037B4C8F4}"/>
-              </a:ext>
-            </a:extLst>
-          </p:cNvPr>
-          <p:cNvSpPr>
-            <a:spLocks noGrp="1"/>
-          </p:cNvSpPr>
-          <p:nvPr>
-            <p:ph type="body" idx="1"/>
-          </p:nvPr>
-        </p:nvSpPr>
-        <p:spPr/>
-        <p:txBody>
-          <a:bodyPr/>
-          <a:lstStyle/>
-          <a:p>
-            <a:endParaRPr lang="en-US"/>
-          </a:p>
-        </p:txBody>
-      </p:sp>
-      <p:sp>
-        <p:nvSpPr>
-          <p:cNvPr id="4" name="Text Placeholder 3">
-            <a:extLst>
-              <a:ext uri="{FF2B5EF4-FFF2-40B4-BE49-F238E27FC236}">
-                <a16:creationId xmlns:a16="http://schemas.microsoft.com/office/drawing/2014/main" id="{F4563075-588E-CA4B-B042-666A4A119392}"/>
-              </a:ext>
-            </a:extLst>
-          </p:cNvPr>
-          <p:cNvSpPr>
-            <a:spLocks noGrp="1"/>
-          </p:cNvSpPr>
-          <p:nvPr>
-            <p:ph type="body" idx="10"/>
-          </p:nvPr>
-        </p:nvSpPr>
-        <p:spPr/>
-        <p:txBody>
-          <a:bodyPr/>
-          <a:lstStyle/>
-          <a:p>
-            <a:endParaRPr lang="en-US"/>
-          </a:p>
-        </p:txBody>
-      </p:sp>
-    </p:spTree>
-    <p:extLst>
-      <p:ext uri="{BB962C8B-B14F-4D97-AF65-F5344CB8AC3E}">
-        <p14:creationId xmlns:p14="http://schemas.microsoft.com/office/powerpoint/2010/main" val="1026755708"/>
-      </p:ext>
-    </p:extLst>
-  </p:cSld>
-  <p:clrMapOvr>
-    <a:masterClrMapping/>
-  </p:clrMapOvr>
-</p:sld>
-</file>
-
-<file path=ppt/slides/slide15.xml><?xml version="1.0" encoding="utf-8"?>
-<p:sld xmlns:a="http://schemas.openxmlformats.org/drawingml/2006/main" xmlns:r="http://schemas.openxmlformats.org/officeDocument/2006/relationships" xmlns:p="http://schemas.openxmlformats.org/presentationml/2006/main">
-  <p:cSld>
-    <p:spTree>
-      <p:nvGrpSpPr>
-        <p:cNvPr id="1" name=""/>
-        <p:cNvGrpSpPr/>
-        <p:nvPr/>
-      </p:nvGrpSpPr>
-      <p:grpSpPr>
-        <a:xfrm>
-          <a:off x="0" y="0"/>
-          <a:ext cx="0" cy="0"/>
-          <a:chOff x="0" y="0"/>
-          <a:chExt cx="0" cy="0"/>
-        </a:xfrm>
-      </p:grpSpPr>
-      <p:sp>
-        <p:nvSpPr>
-          <p:cNvPr id="2" name="Title 1">
-            <a:extLst>
-              <a:ext uri="{FF2B5EF4-FFF2-40B4-BE49-F238E27FC236}">
-                <a16:creationId xmlns:a16="http://schemas.microsoft.com/office/drawing/2014/main" id="{BF70BEA6-6A0D-C64A-BD71-FFD27AA560FE}"/>
-              </a:ext>
-            </a:extLst>
-          </p:cNvPr>
-          <p:cNvSpPr>
-            <a:spLocks noGrp="1"/>
-          </p:cNvSpPr>
-          <p:nvPr>
-            <p:ph type="title"/>
-          </p:nvPr>
-        </p:nvSpPr>
-        <p:spPr/>
-        <p:txBody>
-          <a:bodyPr/>
-          <a:lstStyle/>
-          <a:p>
-            <a:endParaRPr lang="en-US"/>
-          </a:p>
-        </p:txBody>
-      </p:sp>
-      <p:sp>
-        <p:nvSpPr>
-          <p:cNvPr id="3" name="Text Placeholder 2">
-            <a:extLst>
-              <a:ext uri="{FF2B5EF4-FFF2-40B4-BE49-F238E27FC236}">
-                <a16:creationId xmlns:a16="http://schemas.microsoft.com/office/drawing/2014/main" id="{ADDE4792-5F0E-BB41-B416-AD3074421955}"/>
-              </a:ext>
-            </a:extLst>
-          </p:cNvPr>
-          <p:cNvSpPr>
-            <a:spLocks noGrp="1"/>
-          </p:cNvSpPr>
-          <p:nvPr>
-            <p:ph type="body" idx="1"/>
-          </p:nvPr>
-        </p:nvSpPr>
-        <p:spPr/>
-        <p:txBody>
-          <a:bodyPr/>
-          <a:lstStyle/>
-          <a:p>
-            <a:endParaRPr lang="en-US"/>
-          </a:p>
-        </p:txBody>
-      </p:sp>
-      <p:sp>
-        <p:nvSpPr>
-          <p:cNvPr id="4" name="Text Placeholder 3">
-            <a:extLst>
-              <a:ext uri="{FF2B5EF4-FFF2-40B4-BE49-F238E27FC236}">
-                <a16:creationId xmlns:a16="http://schemas.microsoft.com/office/drawing/2014/main" id="{F40A9A4C-FCFA-754C-9375-C8E7F863AB67}"/>
-              </a:ext>
-            </a:extLst>
-          </p:cNvPr>
-          <p:cNvSpPr>
-            <a:spLocks noGrp="1"/>
-          </p:cNvSpPr>
-          <p:nvPr>
-            <p:ph type="body" idx="10"/>
-          </p:nvPr>
-        </p:nvSpPr>
-        <p:spPr/>
-        <p:txBody>
-          <a:bodyPr/>
-          <a:lstStyle/>
-          <a:p>
-            <a:endParaRPr lang="en-US"/>
-          </a:p>
-        </p:txBody>
-      </p:sp>
-    </p:spTree>
-    <p:extLst>
-      <p:ext uri="{BB962C8B-B14F-4D97-AF65-F5344CB8AC3E}">
-        <p14:creationId xmlns:p14="http://schemas.microsoft.com/office/powerpoint/2010/main" val="4051248754"/>
       </p:ext>
     </p:extLst>
   </p:cSld>
@@ -8294,7 +8063,7 @@
               <a:rPr lang="en-US" sz="4400" dirty="0">
                 <a:latin typeface="+mn-lt"/>
               </a:rPr>
-              <a:t>Do you think the fatality rate when up from 2019-2020 or did it go down? </a:t>
+              <a:t>Do you think the car wreck fatality rate when up or down from 2019-2020? </a:t>
             </a:r>
           </a:p>
         </p:txBody>
@@ -8374,7 +8143,7 @@
           <p:nvPr/>
         </p:nvPicPr>
         <p:blipFill>
-          <a:blip r:embed="rId2"/>
+          <a:blip r:embed="rId3"/>
           <a:stretch>
             <a:fillRect/>
           </a:stretch>
@@ -8464,7 +8233,7 @@
           <p:nvPr/>
         </p:nvPicPr>
         <p:blipFill>
-          <a:blip r:embed="rId2"/>
+          <a:blip r:embed="rId3"/>
           <a:stretch>
             <a:fillRect/>
           </a:stretch>
@@ -8473,6 +8242,36 @@
           <a:xfrm>
             <a:off x="1323399" y="1971740"/>
             <a:ext cx="6753801" cy="4624716"/>
+          </a:xfrm>
+          <a:prstGeom prst="rect">
+            <a:avLst/>
+          </a:prstGeom>
+        </p:spPr>
+      </p:pic>
+      <p:pic>
+        <p:nvPicPr>
+          <p:cNvPr id="4" name="Picture 3" descr="Graphical user interface, text, application, email&#10;&#10;Description automatically generated">
+            <a:extLst>
+              <a:ext uri="{FF2B5EF4-FFF2-40B4-BE49-F238E27FC236}">
+                <a16:creationId xmlns:a16="http://schemas.microsoft.com/office/drawing/2014/main" id="{B4C2BB22-7FA0-4A13-9305-59A6FC5A2062}"/>
+              </a:ext>
+            </a:extLst>
+          </p:cNvPr>
+          <p:cNvPicPr>
+            <a:picLocks noChangeAspect="1"/>
+          </p:cNvPicPr>
+          <p:nvPr/>
+        </p:nvPicPr>
+        <p:blipFill>
+          <a:blip r:embed="rId4"/>
+          <a:stretch>
+            <a:fillRect/>
+          </a:stretch>
+        </p:blipFill>
+        <p:spPr>
+          <a:xfrm>
+            <a:off x="5762626" y="2521640"/>
+            <a:ext cx="6225954" cy="3117159"/>
           </a:xfrm>
           <a:prstGeom prst="rect">
             <a:avLst/>
@@ -8511,56 +8310,6 @@
       </p:grpSpPr>
       <p:sp>
         <p:nvSpPr>
-          <p:cNvPr id="2" name="Text Placeholder 1">
-            <a:extLst>
-              <a:ext uri="{FF2B5EF4-FFF2-40B4-BE49-F238E27FC236}">
-                <a16:creationId xmlns:a16="http://schemas.microsoft.com/office/drawing/2014/main" id="{39CFA61C-A3A5-6C49-8B97-554C0781BA39}"/>
-              </a:ext>
-            </a:extLst>
-          </p:cNvPr>
-          <p:cNvSpPr>
-            <a:spLocks noGrp="1"/>
-          </p:cNvSpPr>
-          <p:nvPr>
-            <p:ph type="body" idx="1"/>
-          </p:nvPr>
-        </p:nvSpPr>
-        <p:spPr/>
-        <p:txBody>
-          <a:bodyPr/>
-          <a:lstStyle/>
-          <a:p>
-            <a:endParaRPr lang="en-US"/>
-          </a:p>
-        </p:txBody>
-      </p:sp>
-      <p:sp>
-        <p:nvSpPr>
-          <p:cNvPr id="3" name="Text Placeholder 2">
-            <a:extLst>
-              <a:ext uri="{FF2B5EF4-FFF2-40B4-BE49-F238E27FC236}">
-                <a16:creationId xmlns:a16="http://schemas.microsoft.com/office/drawing/2014/main" id="{7D175072-5513-8F40-964F-46180A852269}"/>
-              </a:ext>
-            </a:extLst>
-          </p:cNvPr>
-          <p:cNvSpPr>
-            <a:spLocks noGrp="1"/>
-          </p:cNvSpPr>
-          <p:nvPr>
-            <p:ph type="body" idx="10"/>
-          </p:nvPr>
-        </p:nvSpPr>
-        <p:spPr/>
-        <p:txBody>
-          <a:bodyPr/>
-          <a:lstStyle/>
-          <a:p>
-            <a:endParaRPr lang="en-US"/>
-          </a:p>
-        </p:txBody>
-      </p:sp>
-      <p:sp>
-        <p:nvSpPr>
           <p:cNvPr id="4" name="Title 3">
             <a:extLst>
               <a:ext uri="{FF2B5EF4-FFF2-40B4-BE49-F238E27FC236}">
@@ -8582,32 +8331,10 @@
           </a:bodyPr>
           <a:lstStyle/>
           <a:p>
-            <a:endParaRPr lang="en-US"/>
-          </a:p>
-        </p:txBody>
-      </p:sp>
-      <p:sp>
-        <p:nvSpPr>
-          <p:cNvPr id="5" name="Text Placeholder 4">
-            <a:extLst>
-              <a:ext uri="{FF2B5EF4-FFF2-40B4-BE49-F238E27FC236}">
-                <a16:creationId xmlns:a16="http://schemas.microsoft.com/office/drawing/2014/main" id="{71F61833-26BF-DD42-B0D6-1248ED05A257}"/>
-              </a:ext>
-            </a:extLst>
-          </p:cNvPr>
-          <p:cNvSpPr>
-            <a:spLocks noGrp="1"/>
-          </p:cNvSpPr>
-          <p:nvPr>
-            <p:ph type="body" idx="11"/>
-          </p:nvPr>
-        </p:nvSpPr>
-        <p:spPr/>
-        <p:txBody>
-          <a:bodyPr/>
-          <a:lstStyle/>
-          <a:p>
-            <a:endParaRPr lang="en-US"/>
+            <a:r>
+              <a:rPr lang="en-US" dirty="0"/>
+              <a:t>Swap to R code </a:t>
+            </a:r>
           </a:p>
         </p:txBody>
       </p:sp>
@@ -8662,7 +8389,7 @@
           <a:bodyPr/>
           <a:lstStyle/>
           <a:p>
-            <a:endParaRPr lang="en-US"/>
+            <a:endParaRPr lang="en-US" dirty="0"/>
           </a:p>
         </p:txBody>
       </p:sp>
@@ -8714,7 +8441,10 @@
           </a:bodyPr>
           <a:lstStyle/>
           <a:p>
-            <a:endParaRPr lang="en-US"/>
+            <a:r>
+              <a:rPr lang="en-US" dirty="0"/>
+              <a:t>Regression Method </a:t>
+            </a:r>
           </a:p>
         </p:txBody>
       </p:sp>
@@ -8775,10 +8505,46 @@
       </p:grpSpPr>
       <p:sp>
         <p:nvSpPr>
-          <p:cNvPr id="2" name="Text Placeholder 1">
-            <a:extLst>
-              <a:ext uri="{FF2B5EF4-FFF2-40B4-BE49-F238E27FC236}">
-                <a16:creationId xmlns:a16="http://schemas.microsoft.com/office/drawing/2014/main" id="{67043EEA-6C9E-D640-AC6F-0839D574211C}"/>
+          <p:cNvPr id="2" name="Title 1">
+            <a:extLst>
+              <a:ext uri="{FF2B5EF4-FFF2-40B4-BE49-F238E27FC236}">
+                <a16:creationId xmlns:a16="http://schemas.microsoft.com/office/drawing/2014/main" id="{3ECC8D95-52D6-3241-A734-32083BDDE7AF}"/>
+              </a:ext>
+            </a:extLst>
+          </p:cNvPr>
+          <p:cNvSpPr>
+            <a:spLocks noGrp="1"/>
+          </p:cNvSpPr>
+          <p:nvPr>
+            <p:ph type="title"/>
+          </p:nvPr>
+        </p:nvSpPr>
+        <p:spPr/>
+        <p:txBody>
+          <a:bodyPr/>
+          <a:lstStyle/>
+          <a:p>
+            <a:r>
+              <a:rPr lang="en-US" dirty="0"/>
+              <a:t>Wrap up &amp; </a:t>
+            </a:r>
+            <a:r>
+              <a:rPr lang="en-US" dirty="0" err="1"/>
+              <a:t>Conculision</a:t>
+            </a:r>
+            <a:r>
+              <a:rPr lang="en-US" dirty="0"/>
+              <a:t> Statement</a:t>
+            </a:r>
+          </a:p>
+        </p:txBody>
+      </p:sp>
+      <p:sp>
+        <p:nvSpPr>
+          <p:cNvPr id="3" name="Text Placeholder 2">
+            <a:extLst>
+              <a:ext uri="{FF2B5EF4-FFF2-40B4-BE49-F238E27FC236}">
+                <a16:creationId xmlns:a16="http://schemas.microsoft.com/office/drawing/2014/main" id="{42C7C238-DDC8-1448-908F-6FD33432D210}"/>
               </a:ext>
             </a:extLst>
           </p:cNvPr>
@@ -8794,91 +8560,14 @@
           <a:bodyPr/>
           <a:lstStyle/>
           <a:p>
-            <a:endParaRPr lang="en-US"/>
-          </a:p>
-        </p:txBody>
-      </p:sp>
-      <p:sp>
-        <p:nvSpPr>
-          <p:cNvPr id="3" name="Text Placeholder 2">
-            <a:extLst>
-              <a:ext uri="{FF2B5EF4-FFF2-40B4-BE49-F238E27FC236}">
-                <a16:creationId xmlns:a16="http://schemas.microsoft.com/office/drawing/2014/main" id="{6605EA6C-7F0D-844B-A2FB-53C8999EA361}"/>
-              </a:ext>
-            </a:extLst>
-          </p:cNvPr>
-          <p:cNvSpPr>
-            <a:spLocks noGrp="1"/>
-          </p:cNvSpPr>
-          <p:nvPr>
-            <p:ph type="body" idx="10"/>
-          </p:nvPr>
-        </p:nvSpPr>
-        <p:spPr/>
-        <p:txBody>
-          <a:bodyPr/>
-          <a:lstStyle/>
-          <a:p>
-            <a:endParaRPr lang="en-US"/>
-          </a:p>
-        </p:txBody>
-      </p:sp>
-      <p:sp>
-        <p:nvSpPr>
-          <p:cNvPr id="4" name="Title 3">
-            <a:extLst>
-              <a:ext uri="{FF2B5EF4-FFF2-40B4-BE49-F238E27FC236}">
-                <a16:creationId xmlns:a16="http://schemas.microsoft.com/office/drawing/2014/main" id="{9AD34FDC-870F-1F44-9337-AB3170DCD07C}"/>
-              </a:ext>
-            </a:extLst>
-          </p:cNvPr>
-          <p:cNvSpPr>
-            <a:spLocks noGrp="1"/>
-          </p:cNvSpPr>
-          <p:nvPr>
-            <p:ph type="title"/>
-          </p:nvPr>
-        </p:nvSpPr>
-        <p:spPr/>
-        <p:txBody>
-          <a:bodyPr>
-            <a:normAutofit fontScale="90000"/>
-          </a:bodyPr>
-          <a:lstStyle/>
-          <a:p>
-            <a:endParaRPr lang="en-US"/>
-          </a:p>
-        </p:txBody>
-      </p:sp>
-      <p:sp>
-        <p:nvSpPr>
-          <p:cNvPr id="5" name="Text Placeholder 4">
-            <a:extLst>
-              <a:ext uri="{FF2B5EF4-FFF2-40B4-BE49-F238E27FC236}">
-                <a16:creationId xmlns:a16="http://schemas.microsoft.com/office/drawing/2014/main" id="{DF6165E9-BB8A-7543-BED8-E080F7DA71DA}"/>
-              </a:ext>
-            </a:extLst>
-          </p:cNvPr>
-          <p:cNvSpPr>
-            <a:spLocks noGrp="1"/>
-          </p:cNvSpPr>
-          <p:nvPr>
-            <p:ph type="body" idx="11"/>
-          </p:nvPr>
-        </p:nvSpPr>
-        <p:spPr/>
-        <p:txBody>
-          <a:bodyPr/>
-          <a:lstStyle/>
-          <a:p>
-            <a:endParaRPr lang="en-US"/>
+            <a:endParaRPr lang="en-US" dirty="0"/>
           </a:p>
         </p:txBody>
       </p:sp>
     </p:spTree>
     <p:extLst>
       <p:ext uri="{BB962C8B-B14F-4D97-AF65-F5344CB8AC3E}">
-        <p14:creationId xmlns:p14="http://schemas.microsoft.com/office/powerpoint/2010/main" val="2540176846"/>
+        <p14:creationId xmlns:p14="http://schemas.microsoft.com/office/powerpoint/2010/main" val="3277854522"/>
       </p:ext>
     </p:extLst>
   </p:cSld>
@@ -8907,10 +8596,90 @@
       </p:grpSpPr>
       <p:sp>
         <p:nvSpPr>
-          <p:cNvPr id="2" name="Title 1">
-            <a:extLst>
-              <a:ext uri="{FF2B5EF4-FFF2-40B4-BE49-F238E27FC236}">
-                <a16:creationId xmlns:a16="http://schemas.microsoft.com/office/drawing/2014/main" id="{3ECC8D95-52D6-3241-A734-32083BDDE7AF}"/>
+          <p:cNvPr id="3" name="Text Placeholder 2">
+            <a:extLst>
+              <a:ext uri="{FF2B5EF4-FFF2-40B4-BE49-F238E27FC236}">
+                <a16:creationId xmlns:a16="http://schemas.microsoft.com/office/drawing/2014/main" id="{6605EA6C-7F0D-844B-A2FB-53C8999EA361}"/>
+              </a:ext>
+            </a:extLst>
+          </p:cNvPr>
+          <p:cNvSpPr>
+            <a:spLocks noGrp="1"/>
+          </p:cNvSpPr>
+          <p:nvPr>
+            <p:ph type="body" idx="10"/>
+          </p:nvPr>
+        </p:nvSpPr>
+        <p:spPr/>
+        <p:txBody>
+          <a:bodyPr/>
+          <a:lstStyle/>
+          <a:p>
+            <a:r>
+              <a:rPr lang="en-US" dirty="0">
+                <a:hlinkClick r:id="rId2"/>
+              </a:rPr>
+              <a:t>*shows </a:t>
+            </a:r>
+            <a:r>
+              <a:rPr lang="en-US" dirty="0" err="1">
+                <a:hlinkClick r:id="rId2"/>
+              </a:rPr>
+              <a:t>fatilities</a:t>
+            </a:r>
+            <a:r>
+              <a:rPr lang="en-US" dirty="0">
+                <a:hlinkClick r:id="rId2"/>
+              </a:rPr>
+              <a:t> differences from </a:t>
+            </a:r>
+            <a:r>
+              <a:rPr lang="en-US" dirty="0">
+                <a:hlinkClick r:id="rId2"/>
+              </a:rPr>
+              <a:t>NHTSA </a:t>
+            </a:r>
+          </a:p>
+          <a:p>
+            <a:endParaRPr lang="en-US" dirty="0">
+              <a:hlinkClick r:id="rId2"/>
+            </a:endParaRPr>
+          </a:p>
+          <a:p>
+            <a:r>
+              <a:rPr lang="en-US" dirty="0">
+                <a:hlinkClick r:id="rId2"/>
+              </a:rPr>
+              <a:t>https://crashstats.nhtsa.dot.gov/Api/Public/ViewPublication/813115</a:t>
+            </a:r>
+            <a:r>
+              <a:rPr lang="en-US" dirty="0"/>
+              <a:t> </a:t>
+            </a:r>
+          </a:p>
+          <a:p>
+            <a:endParaRPr lang="en-US" dirty="0"/>
+          </a:p>
+          <a:p>
+            <a:r>
+              <a:rPr lang="en-US" dirty="0">
+                <a:hlinkClick r:id="rId3"/>
+              </a:rPr>
+              <a:t>https://crashstats.nhtsa.dot.gov/Api/Public/Publication/813120</a:t>
+            </a:r>
+            <a:r>
+              <a:rPr lang="en-US" dirty="0"/>
+              <a:t> </a:t>
+            </a:r>
+          </a:p>
+        </p:txBody>
+      </p:sp>
+      <p:sp>
+        <p:nvSpPr>
+          <p:cNvPr id="4" name="Title 3">
+            <a:extLst>
+              <a:ext uri="{FF2B5EF4-FFF2-40B4-BE49-F238E27FC236}">
+                <a16:creationId xmlns:a16="http://schemas.microsoft.com/office/drawing/2014/main" id="{9AD34FDC-870F-1F44-9337-AB3170DCD07C}"/>
               </a:ext>
             </a:extLst>
           </p:cNvPr>
@@ -8923,19 +8692,24 @@
         </p:nvSpPr>
         <p:spPr/>
         <p:txBody>
-          <a:bodyPr/>
+          <a:bodyPr>
+            <a:normAutofit fontScale="90000"/>
+          </a:bodyPr>
           <a:lstStyle/>
           <a:p>
-            <a:endParaRPr lang="en-US"/>
+            <a:r>
+              <a:rPr lang="en-US" dirty="0"/>
+              <a:t>Extra Links to Analysis by NHTSA</a:t>
+            </a:r>
           </a:p>
         </p:txBody>
       </p:sp>
       <p:sp>
         <p:nvSpPr>
-          <p:cNvPr id="3" name="Text Placeholder 2">
-            <a:extLst>
-              <a:ext uri="{FF2B5EF4-FFF2-40B4-BE49-F238E27FC236}">
-                <a16:creationId xmlns:a16="http://schemas.microsoft.com/office/drawing/2014/main" id="{42C7C238-DDC8-1448-908F-6FD33432D210}"/>
+          <p:cNvPr id="5" name="Text Placeholder 4">
+            <a:extLst>
+              <a:ext uri="{FF2B5EF4-FFF2-40B4-BE49-F238E27FC236}">
+                <a16:creationId xmlns:a16="http://schemas.microsoft.com/office/drawing/2014/main" id="{DF6165E9-BB8A-7543-BED8-E080F7DA71DA}"/>
               </a:ext>
             </a:extLst>
           </p:cNvPr>
@@ -8943,7 +8717,7 @@
             <a:spLocks noGrp="1"/>
           </p:cNvSpPr>
           <p:nvPr>
-            <p:ph type="body" idx="1"/>
+            <p:ph type="body" idx="11"/>
           </p:nvPr>
         </p:nvSpPr>
         <p:spPr/>
@@ -8951,14 +8725,17 @@
           <a:bodyPr/>
           <a:lstStyle/>
           <a:p>
-            <a:endParaRPr lang="en-US"/>
+            <a:r>
+              <a:rPr lang="en-US" dirty="0"/>
+              <a:t>the creators of the FARS</a:t>
+            </a:r>
           </a:p>
         </p:txBody>
       </p:sp>
     </p:spTree>
     <p:extLst>
       <p:ext uri="{BB962C8B-B14F-4D97-AF65-F5344CB8AC3E}">
-        <p14:creationId xmlns:p14="http://schemas.microsoft.com/office/powerpoint/2010/main" val="3277854522"/>
+        <p14:creationId xmlns:p14="http://schemas.microsoft.com/office/powerpoint/2010/main" val="2540176846"/>
       </p:ext>
     </p:extLst>
   </p:cSld>
@@ -9006,7 +8783,10 @@
           <a:bodyPr/>
           <a:lstStyle/>
           <a:p>
-            <a:endParaRPr lang="en-US"/>
+            <a:r>
+              <a:rPr lang="en-US" dirty="0"/>
+              <a:t>GitHub Link</a:t>
+            </a:r>
           </a:p>
         </p:txBody>
       </p:sp>
@@ -9031,7 +8811,28 @@
           <a:bodyPr/>
           <a:lstStyle/>
           <a:p>
-            <a:endParaRPr lang="en-US"/>
+            <a:r>
+              <a:rPr lang="en-US" dirty="0"/>
+              <a:t>Public repo hosted on GitHub</a:t>
+            </a:r>
+          </a:p>
+          <a:p>
+            <a:endParaRPr lang="en-US" dirty="0"/>
+          </a:p>
+          <a:p>
+            <a:r>
+              <a:rPr lang="en-US" dirty="0">
+                <a:hlinkClick r:id="rId2"/>
+              </a:rPr>
+              <a:t>https://github.com/hypothetical-lemon/COMP4441</a:t>
+            </a:r>
+            <a:r>
+              <a:rPr lang="en-US" dirty="0"/>
+              <a:t> </a:t>
+            </a:r>
+          </a:p>
+          <a:p>
+            <a:endParaRPr lang="en-US" dirty="0"/>
           </a:p>
         </p:txBody>
       </p:sp>

</xml_diff>

<commit_message>
remove dead code, update pwt
</commit_message>
<xml_diff>
--- a/COMP4441_final_project.pptx
+++ b/COMP4441_final_project.pptx
@@ -5,19 +5,20 @@
     <p:sldMasterId id="2147483648" r:id="rId1"/>
   </p:sldMasterIdLst>
   <p:notesMasterIdLst>
-    <p:notesMasterId r:id="rId12"/>
+    <p:notesMasterId r:id="rId13"/>
   </p:notesMasterIdLst>
   <p:sldIdLst>
     <p:sldId id="256" r:id="rId2"/>
     <p:sldId id="258" r:id="rId3"/>
     <p:sldId id="262" r:id="rId4"/>
     <p:sldId id="274" r:id="rId5"/>
-    <p:sldId id="263" r:id="rId6"/>
-    <p:sldId id="264" r:id="rId7"/>
-    <p:sldId id="266" r:id="rId8"/>
-    <p:sldId id="265" r:id="rId9"/>
-    <p:sldId id="267" r:id="rId10"/>
-    <p:sldId id="268" r:id="rId11"/>
+    <p:sldId id="275" r:id="rId6"/>
+    <p:sldId id="263" r:id="rId7"/>
+    <p:sldId id="264" r:id="rId8"/>
+    <p:sldId id="266" r:id="rId9"/>
+    <p:sldId id="265" r:id="rId10"/>
+    <p:sldId id="267" r:id="rId11"/>
+    <p:sldId id="268" r:id="rId12"/>
   </p:sldIdLst>
   <p:sldSz cx="12192000" cy="6858000"/>
   <p:notesSz cx="6858000" cy="9144000"/>
@@ -733,7 +734,7 @@
           <a:p>
             <a:fld id="{5CD270A4-E417-1544-8D83-51C2B4F7CE0F}" type="slidenum">
               <a:rPr lang="en-US" smtClean="0"/>
-              <a:t>5</a:t>
+              <a:t>6</a:t>
             </a:fld>
             <a:endParaRPr lang="en-US"/>
           </a:p>
@@ -850,7 +851,7 @@
           <a:p>
             <a:fld id="{5CD270A4-E417-1544-8D83-51C2B4F7CE0F}" type="slidenum">
               <a:rPr lang="en-US" smtClean="0"/>
-              <a:t>7</a:t>
+              <a:t>8</a:t>
             </a:fld>
             <a:endParaRPr lang="en-US"/>
           </a:p>
@@ -7921,7 +7922,19 @@
               <a:rPr lang="en-US" dirty="0">
                 <a:latin typeface="+mn-lt"/>
               </a:rPr>
-              <a:t>Car Wreck Fatalities in the United States 2019-2020</a:t>
+              <a:t>Car Wreck Fatalities </a:t>
+            </a:r>
+            <a:r>
+              <a:rPr lang="en-US">
+                <a:latin typeface="+mn-lt"/>
+              </a:rPr>
+              <a:t>&amp; Covid </a:t>
+            </a:r>
+            <a:r>
+              <a:rPr lang="en-US" dirty="0">
+                <a:latin typeface="+mn-lt"/>
+              </a:rPr>
+              <a:t>in the United States 2019-2020</a:t>
             </a:r>
           </a:p>
         </p:txBody>
@@ -8014,6 +8027,135 @@
           <p:cNvPr id="2" name="Title 1">
             <a:extLst>
               <a:ext uri="{FF2B5EF4-FFF2-40B4-BE49-F238E27FC236}">
+                <a16:creationId xmlns:a16="http://schemas.microsoft.com/office/drawing/2014/main" id="{D75A4DC4-B69B-DC4C-A6FA-BC4335D7B9E5}"/>
+              </a:ext>
+            </a:extLst>
+          </p:cNvPr>
+          <p:cNvSpPr>
+            <a:spLocks noGrp="1"/>
+          </p:cNvSpPr>
+          <p:nvPr>
+            <p:ph type="title"/>
+          </p:nvPr>
+        </p:nvSpPr>
+        <p:spPr/>
+        <p:txBody>
+          <a:bodyPr/>
+          <a:lstStyle/>
+          <a:p>
+            <a:r>
+              <a:rPr lang="en-US" dirty="0"/>
+              <a:t>GitHub Link</a:t>
+            </a:r>
+          </a:p>
+        </p:txBody>
+      </p:sp>
+      <p:sp>
+        <p:nvSpPr>
+          <p:cNvPr id="3" name="Text Placeholder 2">
+            <a:extLst>
+              <a:ext uri="{FF2B5EF4-FFF2-40B4-BE49-F238E27FC236}">
+                <a16:creationId xmlns:a16="http://schemas.microsoft.com/office/drawing/2014/main" id="{63E99C7E-22E8-E643-AEFF-FD88DD2D989D}"/>
+              </a:ext>
+            </a:extLst>
+          </p:cNvPr>
+          <p:cNvSpPr>
+            <a:spLocks noGrp="1"/>
+          </p:cNvSpPr>
+          <p:nvPr>
+            <p:ph type="body" idx="1"/>
+          </p:nvPr>
+        </p:nvSpPr>
+        <p:spPr/>
+        <p:txBody>
+          <a:bodyPr/>
+          <a:lstStyle/>
+          <a:p>
+            <a:r>
+              <a:rPr lang="en-US" dirty="0"/>
+              <a:t>Public repo hosted on GitHub</a:t>
+            </a:r>
+          </a:p>
+          <a:p>
+            <a:endParaRPr lang="en-US" dirty="0"/>
+          </a:p>
+          <a:p>
+            <a:r>
+              <a:rPr lang="en-US" dirty="0">
+                <a:hlinkClick r:id="rId2"/>
+              </a:rPr>
+              <a:t>https://github.com/hypothetical-lemon/COMP4441</a:t>
+            </a:r>
+            <a:r>
+              <a:rPr lang="en-US" dirty="0"/>
+              <a:t> </a:t>
+            </a:r>
+          </a:p>
+          <a:p>
+            <a:endParaRPr lang="en-US" dirty="0"/>
+          </a:p>
+        </p:txBody>
+      </p:sp>
+      <p:sp>
+        <p:nvSpPr>
+          <p:cNvPr id="4" name="Text Placeholder 3">
+            <a:extLst>
+              <a:ext uri="{FF2B5EF4-FFF2-40B4-BE49-F238E27FC236}">
+                <a16:creationId xmlns:a16="http://schemas.microsoft.com/office/drawing/2014/main" id="{1698A16C-8A37-7441-BB64-9C2A53F9F88F}"/>
+              </a:ext>
+            </a:extLst>
+          </p:cNvPr>
+          <p:cNvSpPr>
+            <a:spLocks noGrp="1"/>
+          </p:cNvSpPr>
+          <p:nvPr>
+            <p:ph type="body" idx="10"/>
+          </p:nvPr>
+        </p:nvSpPr>
+        <p:spPr/>
+        <p:txBody>
+          <a:bodyPr/>
+          <a:lstStyle/>
+          <a:p>
+            <a:endParaRPr lang="en-US"/>
+          </a:p>
+        </p:txBody>
+      </p:sp>
+    </p:spTree>
+    <p:extLst>
+      <p:ext uri="{BB962C8B-B14F-4D97-AF65-F5344CB8AC3E}">
+        <p14:creationId xmlns:p14="http://schemas.microsoft.com/office/powerpoint/2010/main" val="2054809379"/>
+      </p:ext>
+    </p:extLst>
+  </p:cSld>
+  <p:clrMapOvr>
+    <a:masterClrMapping/>
+  </p:clrMapOvr>
+</p:sld>
+</file>
+
+<file path=ppt/slides/slide11.xml><?xml version="1.0" encoding="utf-8"?>
+<p:sld xmlns:a="http://schemas.openxmlformats.org/drawingml/2006/main" xmlns:r="http://schemas.openxmlformats.org/officeDocument/2006/relationships" xmlns:p="http://schemas.openxmlformats.org/presentationml/2006/main">
+  <p:cSld>
+    <p:spTree>
+      <p:nvGrpSpPr>
+        <p:cNvPr id="1" name=""/>
+        <p:cNvGrpSpPr/>
+        <p:nvPr/>
+      </p:nvGrpSpPr>
+      <p:grpSpPr>
+        <a:xfrm>
+          <a:off x="0" y="0"/>
+          <a:ext cx="0" cy="0"/>
+          <a:chOff x="0" y="0"/>
+          <a:chExt cx="0" cy="0"/>
+        </a:xfrm>
+      </p:grpSpPr>
+      <p:sp>
+        <p:nvSpPr>
+          <p:cNvPr id="2" name="Title 1">
+            <a:extLst>
+              <a:ext uri="{FF2B5EF4-FFF2-40B4-BE49-F238E27FC236}">
                 <a16:creationId xmlns:a16="http://schemas.microsoft.com/office/drawing/2014/main" id="{7ACA722E-133A-C14E-B940-93B32C189F31}"/>
               </a:ext>
             </a:extLst>
@@ -8457,10 +8599,55 @@
       </p:grpSpPr>
       <p:sp>
         <p:nvSpPr>
+          <p:cNvPr id="3" name="Text Placeholder 2">
+            <a:extLst>
+              <a:ext uri="{FF2B5EF4-FFF2-40B4-BE49-F238E27FC236}">
+                <a16:creationId xmlns:a16="http://schemas.microsoft.com/office/drawing/2014/main" id="{E86FB40A-78DC-4937-A2B3-E9801975A4BB}"/>
+              </a:ext>
+            </a:extLst>
+          </p:cNvPr>
+          <p:cNvSpPr>
+            <a:spLocks noGrp="1"/>
+          </p:cNvSpPr>
+          <p:nvPr>
+            <p:ph type="body" idx="10"/>
+          </p:nvPr>
+        </p:nvSpPr>
+        <p:spPr>
+          <a:xfrm>
+            <a:off x="1619250" y="2070938"/>
+            <a:ext cx="8496299" cy="4079696"/>
+          </a:xfrm>
+        </p:spPr>
+        <p:txBody>
+          <a:bodyPr/>
+          <a:lstStyle/>
+          <a:p>
+            <a:r>
+              <a:rPr lang="en-US" dirty="0"/>
+              <a:t>FARS – 32 csv’s out of those we used 2 per year </a:t>
+            </a:r>
+          </a:p>
+          <a:p>
+            <a:r>
+              <a:rPr lang="en-US" dirty="0"/>
+              <a:t>COVID – 1 csv </a:t>
+            </a:r>
+          </a:p>
+          <a:p>
+            <a:r>
+              <a:rPr lang="en-US" dirty="0"/>
+              <a:t>  </a:t>
+            </a:r>
+          </a:p>
+        </p:txBody>
+      </p:sp>
+      <p:sp>
+        <p:nvSpPr>
           <p:cNvPr id="4" name="Title 3">
             <a:extLst>
               <a:ext uri="{FF2B5EF4-FFF2-40B4-BE49-F238E27FC236}">
-                <a16:creationId xmlns:a16="http://schemas.microsoft.com/office/drawing/2014/main" id="{D5C31181-9F71-124A-A616-B52278965590}"/>
+                <a16:creationId xmlns:a16="http://schemas.microsoft.com/office/drawing/2014/main" id="{D3C18669-FEFF-4692-B0D3-74819FEB0BF2}"/>
               </a:ext>
             </a:extLst>
           </p:cNvPr>
@@ -8479,16 +8666,17 @@
           <a:lstStyle/>
           <a:p>
             <a:r>
-              <a:rPr lang="en-US" dirty="0"/>
-              <a:t>Swap to R code </a:t>
-            </a:r>
+              <a:rPr lang="en-US"/>
+              <a:t>Dataset </a:t>
+            </a:r>
+            <a:endParaRPr lang="en-US" dirty="0"/>
           </a:p>
         </p:txBody>
       </p:sp>
     </p:spTree>
     <p:extLst>
       <p:ext uri="{BB962C8B-B14F-4D97-AF65-F5344CB8AC3E}">
-        <p14:creationId xmlns:p14="http://schemas.microsoft.com/office/powerpoint/2010/main" val="1542365132"/>
+        <p14:creationId xmlns:p14="http://schemas.microsoft.com/office/powerpoint/2010/main" val="2255482013"/>
       </p:ext>
     </p:extLst>
   </p:cSld>
@@ -8517,60 +8705,10 @@
       </p:grpSpPr>
       <p:sp>
         <p:nvSpPr>
-          <p:cNvPr id="2" name="Text Placeholder 1">
-            <a:extLst>
-              <a:ext uri="{FF2B5EF4-FFF2-40B4-BE49-F238E27FC236}">
-                <a16:creationId xmlns:a16="http://schemas.microsoft.com/office/drawing/2014/main" id="{E462C08C-C650-D141-8F4D-5C9B8A4C6CF0}"/>
-              </a:ext>
-            </a:extLst>
-          </p:cNvPr>
-          <p:cNvSpPr>
-            <a:spLocks noGrp="1"/>
-          </p:cNvSpPr>
-          <p:nvPr>
-            <p:ph type="body" idx="1"/>
-          </p:nvPr>
-        </p:nvSpPr>
-        <p:spPr/>
-        <p:txBody>
-          <a:bodyPr/>
-          <a:lstStyle/>
-          <a:p>
-            <a:endParaRPr lang="en-US" dirty="0"/>
-          </a:p>
-        </p:txBody>
-      </p:sp>
-      <p:sp>
-        <p:nvSpPr>
-          <p:cNvPr id="3" name="Text Placeholder 2">
-            <a:extLst>
-              <a:ext uri="{FF2B5EF4-FFF2-40B4-BE49-F238E27FC236}">
-                <a16:creationId xmlns:a16="http://schemas.microsoft.com/office/drawing/2014/main" id="{A28A8389-6204-3047-A5FD-FED5150648E6}"/>
-              </a:ext>
-            </a:extLst>
-          </p:cNvPr>
-          <p:cNvSpPr>
-            <a:spLocks noGrp="1"/>
-          </p:cNvSpPr>
-          <p:nvPr>
-            <p:ph type="body" idx="10"/>
-          </p:nvPr>
-        </p:nvSpPr>
-        <p:spPr/>
-        <p:txBody>
-          <a:bodyPr/>
-          <a:lstStyle/>
-          <a:p>
-            <a:endParaRPr lang="en-US"/>
-          </a:p>
-        </p:txBody>
-      </p:sp>
-      <p:sp>
-        <p:nvSpPr>
           <p:cNvPr id="4" name="Title 3">
             <a:extLst>
               <a:ext uri="{FF2B5EF4-FFF2-40B4-BE49-F238E27FC236}">
-                <a16:creationId xmlns:a16="http://schemas.microsoft.com/office/drawing/2014/main" id="{98885857-55A3-B84A-9645-0D6CA4FAC082}"/>
+                <a16:creationId xmlns:a16="http://schemas.microsoft.com/office/drawing/2014/main" id="{D5C31181-9F71-124A-A616-B52278965590}"/>
               </a:ext>
             </a:extLst>
           </p:cNvPr>
@@ -8590,40 +8728,15 @@
           <a:p>
             <a:r>
               <a:rPr lang="en-US" dirty="0"/>
-              <a:t>Regression Method </a:t>
-            </a:r>
-          </a:p>
-        </p:txBody>
-      </p:sp>
-      <p:sp>
-        <p:nvSpPr>
-          <p:cNvPr id="5" name="Text Placeholder 4">
-            <a:extLst>
-              <a:ext uri="{FF2B5EF4-FFF2-40B4-BE49-F238E27FC236}">
-                <a16:creationId xmlns:a16="http://schemas.microsoft.com/office/drawing/2014/main" id="{AFAE9434-BDE7-5744-9B9E-91861EB439A9}"/>
-              </a:ext>
-            </a:extLst>
-          </p:cNvPr>
-          <p:cNvSpPr>
-            <a:spLocks noGrp="1"/>
-          </p:cNvSpPr>
-          <p:nvPr>
-            <p:ph type="body" idx="11"/>
-          </p:nvPr>
-        </p:nvSpPr>
-        <p:spPr/>
-        <p:txBody>
-          <a:bodyPr/>
-          <a:lstStyle/>
-          <a:p>
-            <a:endParaRPr lang="en-US"/>
+              <a:t>Swap to R code </a:t>
+            </a:r>
           </a:p>
         </p:txBody>
       </p:sp>
     </p:spTree>
     <p:extLst>
       <p:ext uri="{BB962C8B-B14F-4D97-AF65-F5344CB8AC3E}">
-        <p14:creationId xmlns:p14="http://schemas.microsoft.com/office/powerpoint/2010/main" val="3065850940"/>
+        <p14:creationId xmlns:p14="http://schemas.microsoft.com/office/powerpoint/2010/main" val="1542365132"/>
       </p:ext>
     </p:extLst>
   </p:cSld>
@@ -8652,46 +8765,10 @@
       </p:grpSpPr>
       <p:sp>
         <p:nvSpPr>
-          <p:cNvPr id="2" name="Title 1">
-            <a:extLst>
-              <a:ext uri="{FF2B5EF4-FFF2-40B4-BE49-F238E27FC236}">
-                <a16:creationId xmlns:a16="http://schemas.microsoft.com/office/drawing/2014/main" id="{3ECC8D95-52D6-3241-A734-32083BDDE7AF}"/>
-              </a:ext>
-            </a:extLst>
-          </p:cNvPr>
-          <p:cNvSpPr>
-            <a:spLocks noGrp="1"/>
-          </p:cNvSpPr>
-          <p:nvPr>
-            <p:ph type="title"/>
-          </p:nvPr>
-        </p:nvSpPr>
-        <p:spPr/>
-        <p:txBody>
-          <a:bodyPr/>
-          <a:lstStyle/>
-          <a:p>
-            <a:r>
-              <a:rPr lang="en-US" dirty="0"/>
-              <a:t>Wrap up &amp; </a:t>
-            </a:r>
-            <a:r>
-              <a:rPr lang="en-US" dirty="0" err="1"/>
-              <a:t>Conculision</a:t>
-            </a:r>
-            <a:r>
-              <a:rPr lang="en-US" dirty="0"/>
-              <a:t> Statement</a:t>
-            </a:r>
-          </a:p>
-        </p:txBody>
-      </p:sp>
-      <p:sp>
-        <p:nvSpPr>
-          <p:cNvPr id="3" name="Text Placeholder 2">
-            <a:extLst>
-              <a:ext uri="{FF2B5EF4-FFF2-40B4-BE49-F238E27FC236}">
-                <a16:creationId xmlns:a16="http://schemas.microsoft.com/office/drawing/2014/main" id="{42C7C238-DDC8-1448-908F-6FD33432D210}"/>
+          <p:cNvPr id="2" name="Text Placeholder 1">
+            <a:extLst>
+              <a:ext uri="{FF2B5EF4-FFF2-40B4-BE49-F238E27FC236}">
+                <a16:creationId xmlns:a16="http://schemas.microsoft.com/office/drawing/2014/main" id="{E462C08C-C650-D141-8F4D-5C9B8A4C6CF0}"/>
               </a:ext>
             </a:extLst>
           </p:cNvPr>
@@ -8711,10 +8788,90 @@
           </a:p>
         </p:txBody>
       </p:sp>
+      <p:sp>
+        <p:nvSpPr>
+          <p:cNvPr id="3" name="Text Placeholder 2">
+            <a:extLst>
+              <a:ext uri="{FF2B5EF4-FFF2-40B4-BE49-F238E27FC236}">
+                <a16:creationId xmlns:a16="http://schemas.microsoft.com/office/drawing/2014/main" id="{A28A8389-6204-3047-A5FD-FED5150648E6}"/>
+              </a:ext>
+            </a:extLst>
+          </p:cNvPr>
+          <p:cNvSpPr>
+            <a:spLocks noGrp="1"/>
+          </p:cNvSpPr>
+          <p:nvPr>
+            <p:ph type="body" idx="10"/>
+          </p:nvPr>
+        </p:nvSpPr>
+        <p:spPr/>
+        <p:txBody>
+          <a:bodyPr/>
+          <a:lstStyle/>
+          <a:p>
+            <a:endParaRPr lang="en-US"/>
+          </a:p>
+        </p:txBody>
+      </p:sp>
+      <p:sp>
+        <p:nvSpPr>
+          <p:cNvPr id="4" name="Title 3">
+            <a:extLst>
+              <a:ext uri="{FF2B5EF4-FFF2-40B4-BE49-F238E27FC236}">
+                <a16:creationId xmlns:a16="http://schemas.microsoft.com/office/drawing/2014/main" id="{98885857-55A3-B84A-9645-0D6CA4FAC082}"/>
+              </a:ext>
+            </a:extLst>
+          </p:cNvPr>
+          <p:cNvSpPr>
+            <a:spLocks noGrp="1"/>
+          </p:cNvSpPr>
+          <p:nvPr>
+            <p:ph type="title"/>
+          </p:nvPr>
+        </p:nvSpPr>
+        <p:spPr/>
+        <p:txBody>
+          <a:bodyPr>
+            <a:normAutofit fontScale="90000"/>
+          </a:bodyPr>
+          <a:lstStyle/>
+          <a:p>
+            <a:r>
+              <a:rPr lang="en-US" dirty="0"/>
+              <a:t>Regression Method </a:t>
+            </a:r>
+          </a:p>
+        </p:txBody>
+      </p:sp>
+      <p:sp>
+        <p:nvSpPr>
+          <p:cNvPr id="5" name="Text Placeholder 4">
+            <a:extLst>
+              <a:ext uri="{FF2B5EF4-FFF2-40B4-BE49-F238E27FC236}">
+                <a16:creationId xmlns:a16="http://schemas.microsoft.com/office/drawing/2014/main" id="{AFAE9434-BDE7-5744-9B9E-91861EB439A9}"/>
+              </a:ext>
+            </a:extLst>
+          </p:cNvPr>
+          <p:cNvSpPr>
+            <a:spLocks noGrp="1"/>
+          </p:cNvSpPr>
+          <p:nvPr>
+            <p:ph type="body" idx="11"/>
+          </p:nvPr>
+        </p:nvSpPr>
+        <p:spPr/>
+        <p:txBody>
+          <a:bodyPr/>
+          <a:lstStyle/>
+          <a:p>
+            <a:endParaRPr lang="en-US"/>
+          </a:p>
+        </p:txBody>
+      </p:sp>
     </p:spTree>
     <p:extLst>
       <p:ext uri="{BB962C8B-B14F-4D97-AF65-F5344CB8AC3E}">
-        <p14:creationId xmlns:p14="http://schemas.microsoft.com/office/powerpoint/2010/main" val="3277854522"/>
+        <p14:creationId xmlns:p14="http://schemas.microsoft.com/office/powerpoint/2010/main" val="3065850940"/>
       </p:ext>
     </p:extLst>
   </p:cSld>
@@ -8743,84 +8900,10 @@
       </p:grpSpPr>
       <p:sp>
         <p:nvSpPr>
-          <p:cNvPr id="3" name="Text Placeholder 2">
-            <a:extLst>
-              <a:ext uri="{FF2B5EF4-FFF2-40B4-BE49-F238E27FC236}">
-                <a16:creationId xmlns:a16="http://schemas.microsoft.com/office/drawing/2014/main" id="{6605EA6C-7F0D-844B-A2FB-53C8999EA361}"/>
-              </a:ext>
-            </a:extLst>
-          </p:cNvPr>
-          <p:cNvSpPr>
-            <a:spLocks noGrp="1"/>
-          </p:cNvSpPr>
-          <p:nvPr>
-            <p:ph type="body" idx="10"/>
-          </p:nvPr>
-        </p:nvSpPr>
-        <p:spPr/>
-        <p:txBody>
-          <a:bodyPr/>
-          <a:lstStyle/>
-          <a:p>
-            <a:r>
-              <a:rPr lang="en-US" dirty="0">
-                <a:hlinkClick r:id="rId2"/>
-              </a:rPr>
-              <a:t>*shows </a:t>
-            </a:r>
-            <a:r>
-              <a:rPr lang="en-US" dirty="0" err="1">
-                <a:hlinkClick r:id="rId2"/>
-              </a:rPr>
-              <a:t>fatilities</a:t>
-            </a:r>
-            <a:r>
-              <a:rPr lang="en-US" dirty="0">
-                <a:hlinkClick r:id="rId2"/>
-              </a:rPr>
-              <a:t> differences from NHTSA </a:t>
-            </a:r>
-          </a:p>
-          <a:p>
-            <a:endParaRPr lang="en-US" dirty="0">
-              <a:hlinkClick r:id="rId2"/>
-            </a:endParaRPr>
-          </a:p>
-          <a:p>
-            <a:r>
-              <a:rPr lang="en-US" dirty="0">
-                <a:hlinkClick r:id="rId2"/>
-              </a:rPr>
-              <a:t>https://crashstats.nhtsa.dot.gov/Api/Public/ViewPublication/813115</a:t>
-            </a:r>
-            <a:r>
-              <a:rPr lang="en-US" dirty="0"/>
-              <a:t> </a:t>
-            </a:r>
-          </a:p>
-          <a:p>
-            <a:endParaRPr lang="en-US" dirty="0"/>
-          </a:p>
-          <a:p>
-            <a:r>
-              <a:rPr lang="en-US" dirty="0">
-                <a:hlinkClick r:id="rId3"/>
-              </a:rPr>
-              <a:t>https://crashstats.nhtsa.dot.gov/Api/Public/Publication/813120</a:t>
-            </a:r>
-            <a:r>
-              <a:rPr lang="en-US" dirty="0"/>
-              <a:t> </a:t>
-            </a:r>
-          </a:p>
-        </p:txBody>
-      </p:sp>
-      <p:sp>
-        <p:nvSpPr>
-          <p:cNvPr id="4" name="Title 3">
-            <a:extLst>
-              <a:ext uri="{FF2B5EF4-FFF2-40B4-BE49-F238E27FC236}">
-                <a16:creationId xmlns:a16="http://schemas.microsoft.com/office/drawing/2014/main" id="{9AD34FDC-870F-1F44-9337-AB3170DCD07C}"/>
+          <p:cNvPr id="2" name="Title 1">
+            <a:extLst>
+              <a:ext uri="{FF2B5EF4-FFF2-40B4-BE49-F238E27FC236}">
+                <a16:creationId xmlns:a16="http://schemas.microsoft.com/office/drawing/2014/main" id="{3ECC8D95-52D6-3241-A734-32083BDDE7AF}"/>
               </a:ext>
             </a:extLst>
           </p:cNvPr>
@@ -8833,24 +8916,30 @@
         </p:nvSpPr>
         <p:spPr/>
         <p:txBody>
-          <a:bodyPr>
-            <a:normAutofit fontScale="90000"/>
-          </a:bodyPr>
+          <a:bodyPr/>
           <a:lstStyle/>
           <a:p>
             <a:r>
               <a:rPr lang="en-US" dirty="0"/>
-              <a:t>Extra Links to Analysis by NHTSA</a:t>
+              <a:t>Wrap up &amp; </a:t>
+            </a:r>
+            <a:r>
+              <a:rPr lang="en-US" dirty="0" err="1"/>
+              <a:t>Conculision</a:t>
+            </a:r>
+            <a:r>
+              <a:rPr lang="en-US" dirty="0"/>
+              <a:t> Statement</a:t>
             </a:r>
           </a:p>
         </p:txBody>
       </p:sp>
       <p:sp>
         <p:nvSpPr>
-          <p:cNvPr id="5" name="Text Placeholder 4">
-            <a:extLst>
-              <a:ext uri="{FF2B5EF4-FFF2-40B4-BE49-F238E27FC236}">
-                <a16:creationId xmlns:a16="http://schemas.microsoft.com/office/drawing/2014/main" id="{DF6165E9-BB8A-7543-BED8-E080F7DA71DA}"/>
+          <p:cNvPr id="3" name="Text Placeholder 2">
+            <a:extLst>
+              <a:ext uri="{FF2B5EF4-FFF2-40B4-BE49-F238E27FC236}">
+                <a16:creationId xmlns:a16="http://schemas.microsoft.com/office/drawing/2014/main" id="{42C7C238-DDC8-1448-908F-6FD33432D210}"/>
               </a:ext>
             </a:extLst>
           </p:cNvPr>
@@ -8858,7 +8947,7 @@
             <a:spLocks noGrp="1"/>
           </p:cNvSpPr>
           <p:nvPr>
-            <p:ph type="body" idx="11"/>
+            <p:ph type="body" idx="1"/>
           </p:nvPr>
         </p:nvSpPr>
         <p:spPr/>
@@ -8866,17 +8955,14 @@
           <a:bodyPr/>
           <a:lstStyle/>
           <a:p>
-            <a:r>
-              <a:rPr lang="en-US" dirty="0"/>
-              <a:t>the creators of the FARS</a:t>
-            </a:r>
+            <a:endParaRPr lang="en-US" dirty="0"/>
           </a:p>
         </p:txBody>
       </p:sp>
     </p:spTree>
     <p:extLst>
       <p:ext uri="{BB962C8B-B14F-4D97-AF65-F5344CB8AC3E}">
-        <p14:creationId xmlns:p14="http://schemas.microsoft.com/office/powerpoint/2010/main" val="2540176846"/>
+        <p14:creationId xmlns:p14="http://schemas.microsoft.com/office/powerpoint/2010/main" val="3277854522"/>
       </p:ext>
     </p:extLst>
   </p:cSld>
@@ -8905,10 +8991,109 @@
       </p:grpSpPr>
       <p:sp>
         <p:nvSpPr>
-          <p:cNvPr id="2" name="Title 1">
-            <a:extLst>
-              <a:ext uri="{FF2B5EF4-FFF2-40B4-BE49-F238E27FC236}">
-                <a16:creationId xmlns:a16="http://schemas.microsoft.com/office/drawing/2014/main" id="{D75A4DC4-B69B-DC4C-A6FA-BC4335D7B9E5}"/>
+          <p:cNvPr id="3" name="Text Placeholder 2">
+            <a:extLst>
+              <a:ext uri="{FF2B5EF4-FFF2-40B4-BE49-F238E27FC236}">
+                <a16:creationId xmlns:a16="http://schemas.microsoft.com/office/drawing/2014/main" id="{6605EA6C-7F0D-844B-A2FB-53C8999EA361}"/>
+              </a:ext>
+            </a:extLst>
+          </p:cNvPr>
+          <p:cNvSpPr>
+            <a:spLocks noGrp="1"/>
+          </p:cNvSpPr>
+          <p:nvPr>
+            <p:ph type="body" idx="10"/>
+          </p:nvPr>
+        </p:nvSpPr>
+        <p:spPr>
+          <a:xfrm>
+            <a:off x="2435954" y="2070938"/>
+            <a:ext cx="6452329" cy="4079696"/>
+          </a:xfrm>
+        </p:spPr>
+        <p:txBody>
+          <a:bodyPr>
+            <a:normAutofit lnSpcReduction="10000"/>
+          </a:bodyPr>
+          <a:lstStyle/>
+          <a:p>
+            <a:r>
+              <a:rPr lang="en-US" dirty="0">
+                <a:hlinkClick r:id="rId2"/>
+              </a:rPr>
+              <a:t>*shows </a:t>
+            </a:r>
+            <a:r>
+              <a:rPr lang="en-US" dirty="0" err="1">
+                <a:hlinkClick r:id="rId2"/>
+              </a:rPr>
+              <a:t>fatilities</a:t>
+            </a:r>
+            <a:r>
+              <a:rPr lang="en-US" dirty="0">
+                <a:hlinkClick r:id="rId2"/>
+              </a:rPr>
+              <a:t> differences from NHTSA* </a:t>
+            </a:r>
+          </a:p>
+          <a:p>
+            <a:endParaRPr lang="en-US" dirty="0">
+              <a:hlinkClick r:id="rId2"/>
+            </a:endParaRPr>
+          </a:p>
+          <a:p>
+            <a:r>
+              <a:rPr lang="en-US" dirty="0">
+                <a:hlinkClick r:id="rId2"/>
+              </a:rPr>
+              <a:t>https://crashstats.nhtsa.dot.gov/Api/Public/ViewPublication/813115</a:t>
+            </a:r>
+            <a:r>
+              <a:rPr lang="en-US" dirty="0"/>
+              <a:t> </a:t>
+            </a:r>
+          </a:p>
+          <a:p>
+            <a:endParaRPr lang="en-US" dirty="0"/>
+          </a:p>
+          <a:p>
+            <a:r>
+              <a:rPr lang="en-US" dirty="0">
+                <a:hlinkClick r:id="rId3"/>
+              </a:rPr>
+              <a:t>https://crashstats.nhtsa.dot.gov/Api/Public/Publication/813120</a:t>
+            </a:r>
+            <a:r>
+              <a:rPr lang="en-US" dirty="0"/>
+              <a:t> </a:t>
+            </a:r>
+          </a:p>
+          <a:p>
+            <a:r>
+              <a:rPr lang="en-US" dirty="0"/>
+              <a:t>#dataset download</a:t>
+            </a:r>
+          </a:p>
+          <a:p>
+            <a:r>
+              <a:rPr lang="en-US" dirty="0">
+                <a:hlinkClick r:id="rId4"/>
+              </a:rPr>
+              <a:t>https://www.nhtsa.gov/file-downloads?p=nhtsa/downloads/FARS/</a:t>
+            </a:r>
+            <a:r>
+              <a:rPr lang="en-US" dirty="0"/>
+              <a:t> </a:t>
+            </a:r>
+          </a:p>
+        </p:txBody>
+      </p:sp>
+      <p:sp>
+        <p:nvSpPr>
+          <p:cNvPr id="4" name="Title 3">
+            <a:extLst>
+              <a:ext uri="{FF2B5EF4-FFF2-40B4-BE49-F238E27FC236}">
+                <a16:creationId xmlns:a16="http://schemas.microsoft.com/office/drawing/2014/main" id="{9AD34FDC-870F-1F44-9337-AB3170DCD07C}"/>
               </a:ext>
             </a:extLst>
           </p:cNvPr>
@@ -8921,22 +9106,24 @@
         </p:nvSpPr>
         <p:spPr/>
         <p:txBody>
-          <a:bodyPr/>
+          <a:bodyPr>
+            <a:normAutofit fontScale="90000"/>
+          </a:bodyPr>
           <a:lstStyle/>
           <a:p>
             <a:r>
               <a:rPr lang="en-US" dirty="0"/>
-              <a:t>GitHub Link</a:t>
+              <a:t>Extra Links to Analysis by NHTSA</a:t>
             </a:r>
           </a:p>
         </p:txBody>
       </p:sp>
       <p:sp>
         <p:nvSpPr>
-          <p:cNvPr id="3" name="Text Placeholder 2">
-            <a:extLst>
-              <a:ext uri="{FF2B5EF4-FFF2-40B4-BE49-F238E27FC236}">
-                <a16:creationId xmlns:a16="http://schemas.microsoft.com/office/drawing/2014/main" id="{63E99C7E-22E8-E643-AEFF-FD88DD2D989D}"/>
+          <p:cNvPr id="5" name="Text Placeholder 4">
+            <a:extLst>
+              <a:ext uri="{FF2B5EF4-FFF2-40B4-BE49-F238E27FC236}">
+                <a16:creationId xmlns:a16="http://schemas.microsoft.com/office/drawing/2014/main" id="{DF6165E9-BB8A-7543-BED8-E080F7DA71DA}"/>
               </a:ext>
             </a:extLst>
           </p:cNvPr>
@@ -8944,7 +9131,7 @@
             <a:spLocks noGrp="1"/>
           </p:cNvSpPr>
           <p:nvPr>
-            <p:ph type="body" idx="1"/>
+            <p:ph type="body" idx="11"/>
           </p:nvPr>
         </p:nvSpPr>
         <p:spPr/>
@@ -8954,58 +9141,15 @@
           <a:p>
             <a:r>
               <a:rPr lang="en-US" dirty="0"/>
-              <a:t>Public repo hosted on GitHub</a:t>
-            </a:r>
-          </a:p>
-          <a:p>
-            <a:endParaRPr lang="en-US" dirty="0"/>
-          </a:p>
-          <a:p>
-            <a:r>
-              <a:rPr lang="en-US" dirty="0">
-                <a:hlinkClick r:id="rId2"/>
-              </a:rPr>
-              <a:t>https://github.com/hypothetical-lemon/COMP4441</a:t>
-            </a:r>
-            <a:r>
-              <a:rPr lang="en-US" dirty="0"/>
-              <a:t> </a:t>
-            </a:r>
-          </a:p>
-          <a:p>
-            <a:endParaRPr lang="en-US" dirty="0"/>
-          </a:p>
-        </p:txBody>
-      </p:sp>
-      <p:sp>
-        <p:nvSpPr>
-          <p:cNvPr id="4" name="Text Placeholder 3">
-            <a:extLst>
-              <a:ext uri="{FF2B5EF4-FFF2-40B4-BE49-F238E27FC236}">
-                <a16:creationId xmlns:a16="http://schemas.microsoft.com/office/drawing/2014/main" id="{1698A16C-8A37-7441-BB64-9C2A53F9F88F}"/>
-              </a:ext>
-            </a:extLst>
-          </p:cNvPr>
-          <p:cNvSpPr>
-            <a:spLocks noGrp="1"/>
-          </p:cNvSpPr>
-          <p:nvPr>
-            <p:ph type="body" idx="10"/>
-          </p:nvPr>
-        </p:nvSpPr>
-        <p:spPr/>
-        <p:txBody>
-          <a:bodyPr/>
-          <a:lstStyle/>
-          <a:p>
-            <a:endParaRPr lang="en-US"/>
+              <a:t>the creators of the FARS</a:t>
+            </a:r>
           </a:p>
         </p:txBody>
       </p:sp>
     </p:spTree>
     <p:extLst>
       <p:ext uri="{BB962C8B-B14F-4D97-AF65-F5344CB8AC3E}">
-        <p14:creationId xmlns:p14="http://schemas.microsoft.com/office/powerpoint/2010/main" val="2054809379"/>
+        <p14:creationId xmlns:p14="http://schemas.microsoft.com/office/powerpoint/2010/main" val="2540176846"/>
       </p:ext>
     </p:extLst>
   </p:cSld>

</xml_diff>